<commit_message>
current sharing path figures
</commit_message>
<xml_diff>
--- a/WPT/Power-Sharing/Matlab/New Microsoft PowerPoint Presentation.pptx
+++ b/WPT/Power-Sharing/Matlab/New Microsoft PowerPoint Presentation.pptx
@@ -6,6 +6,7 @@
   </p:sldMasterIdLst>
   <p:sldIdLst>
     <p:sldId id="256" r:id="rId2"/>
+    <p:sldId id="257" r:id="rId3"/>
   </p:sldIdLst>
   <p:sldSz cx="12192000" cy="6858000"/>
   <p:notesSz cx="6858000" cy="9144000"/>
@@ -104,6 +105,11 @@
       </a:defRPr>
     </a:lvl9pPr>
   </p:defaultTextStyle>
+  <p:extLst>
+    <p:ext uri="{EFAFB233-063F-42B5-8137-9DF3F51BA10A}">
+      <p15:sldGuideLst xmlns:p15="http://schemas.microsoft.com/office/powerpoint/2012/main"/>
+    </p:ext>
+  </p:extLst>
 </p:presentation>
 </file>
 
@@ -254,7 +260,7 @@
           <a:p>
             <a:fld id="{68AED211-2D36-4776-ABE1-F5BA8496A799}" type="datetimeFigureOut">
               <a:rPr lang="en-US" smtClean="0"/>
-              <a:t>3/10/2023</a:t>
+              <a:t>3/15/2023</a:t>
             </a:fld>
             <a:endParaRPr lang="en-US"/>
           </a:p>
@@ -452,7 +458,7 @@
           <a:p>
             <a:fld id="{68AED211-2D36-4776-ABE1-F5BA8496A799}" type="datetimeFigureOut">
               <a:rPr lang="en-US" smtClean="0"/>
-              <a:t>3/10/2023</a:t>
+              <a:t>3/15/2023</a:t>
             </a:fld>
             <a:endParaRPr lang="en-US"/>
           </a:p>
@@ -660,7 +666,7 @@
           <a:p>
             <a:fld id="{68AED211-2D36-4776-ABE1-F5BA8496A799}" type="datetimeFigureOut">
               <a:rPr lang="en-US" smtClean="0"/>
-              <a:t>3/10/2023</a:t>
+              <a:t>3/15/2023</a:t>
             </a:fld>
             <a:endParaRPr lang="en-US"/>
           </a:p>
@@ -858,7 +864,7 @@
           <a:p>
             <a:fld id="{68AED211-2D36-4776-ABE1-F5BA8496A799}" type="datetimeFigureOut">
               <a:rPr lang="en-US" smtClean="0"/>
-              <a:t>3/10/2023</a:t>
+              <a:t>3/15/2023</a:t>
             </a:fld>
             <a:endParaRPr lang="en-US"/>
           </a:p>
@@ -1133,7 +1139,7 @@
           <a:p>
             <a:fld id="{68AED211-2D36-4776-ABE1-F5BA8496A799}" type="datetimeFigureOut">
               <a:rPr lang="en-US" smtClean="0"/>
-              <a:t>3/10/2023</a:t>
+              <a:t>3/15/2023</a:t>
             </a:fld>
             <a:endParaRPr lang="en-US"/>
           </a:p>
@@ -1398,7 +1404,7 @@
           <a:p>
             <a:fld id="{68AED211-2D36-4776-ABE1-F5BA8496A799}" type="datetimeFigureOut">
               <a:rPr lang="en-US" smtClean="0"/>
-              <a:t>3/10/2023</a:t>
+              <a:t>3/15/2023</a:t>
             </a:fld>
             <a:endParaRPr lang="en-US"/>
           </a:p>
@@ -1810,7 +1816,7 @@
           <a:p>
             <a:fld id="{68AED211-2D36-4776-ABE1-F5BA8496A799}" type="datetimeFigureOut">
               <a:rPr lang="en-US" smtClean="0"/>
-              <a:t>3/10/2023</a:t>
+              <a:t>3/15/2023</a:t>
             </a:fld>
             <a:endParaRPr lang="en-US"/>
           </a:p>
@@ -1951,7 +1957,7 @@
           <a:p>
             <a:fld id="{68AED211-2D36-4776-ABE1-F5BA8496A799}" type="datetimeFigureOut">
               <a:rPr lang="en-US" smtClean="0"/>
-              <a:t>3/10/2023</a:t>
+              <a:t>3/15/2023</a:t>
             </a:fld>
             <a:endParaRPr lang="en-US"/>
           </a:p>
@@ -2064,7 +2070,7 @@
           <a:p>
             <a:fld id="{68AED211-2D36-4776-ABE1-F5BA8496A799}" type="datetimeFigureOut">
               <a:rPr lang="en-US" smtClean="0"/>
-              <a:t>3/10/2023</a:t>
+              <a:t>3/15/2023</a:t>
             </a:fld>
             <a:endParaRPr lang="en-US"/>
           </a:p>
@@ -2375,7 +2381,7 @@
           <a:p>
             <a:fld id="{68AED211-2D36-4776-ABE1-F5BA8496A799}" type="datetimeFigureOut">
               <a:rPr lang="en-US" smtClean="0"/>
-              <a:t>3/10/2023</a:t>
+              <a:t>3/15/2023</a:t>
             </a:fld>
             <a:endParaRPr lang="en-US"/>
           </a:p>
@@ -2663,7 +2669,7 @@
           <a:p>
             <a:fld id="{68AED211-2D36-4776-ABE1-F5BA8496A799}" type="datetimeFigureOut">
               <a:rPr lang="en-US" smtClean="0"/>
-              <a:t>3/10/2023</a:t>
+              <a:t>3/15/2023</a:t>
             </a:fld>
             <a:endParaRPr lang="en-US"/>
           </a:p>
@@ -2904,7 +2910,7 @@
           <a:p>
             <a:fld id="{68AED211-2D36-4776-ABE1-F5BA8496A799}" type="datetimeFigureOut">
               <a:rPr lang="en-US" smtClean="0"/>
-              <a:t>3/10/2023</a:t>
+              <a:t>3/15/2023</a:t>
             </a:fld>
             <a:endParaRPr lang="en-US"/>
           </a:p>
@@ -3835,8 +3841,8 @@
           </a:fontRef>
         </p:style>
       </p:cxnSp>
-      <mc:AlternateContent xmlns:mc="http://schemas.openxmlformats.org/markup-compatibility/2006">
-        <mc:Choice xmlns:a14="http://schemas.microsoft.com/office/drawing/2010/main" Requires="a14">
+      <mc:AlternateContent xmlns:mc="http://schemas.openxmlformats.org/markup-compatibility/2006" xmlns:a14="http://schemas.microsoft.com/office/drawing/2010/main">
+        <mc:Choice Requires="a14">
           <p:sp>
             <p:nvSpPr>
               <p:cNvPr id="51" name="TextBox 50">
@@ -3865,6 +3871,7 @@
               </a:bodyPr>
               <a:lstStyle/>
               <a:p>
+                <a:pPr/>
                 <a14:m>
                   <m:oMathPara xmlns:m="http://schemas.openxmlformats.org/officeDocument/2006/math">
                     <m:oMathParaPr>
@@ -3885,7 +3892,7 @@
             </p:txBody>
           </p:sp>
         </mc:Choice>
-        <mc:Fallback>
+        <mc:Fallback xmlns="">
           <p:sp>
             <p:nvSpPr>
               <p:cNvPr id="51" name="TextBox 50">
@@ -3959,8 +3966,8 @@
           </a:prstGeom>
         </p:spPr>
       </p:pic>
-      <mc:AlternateContent xmlns:mc="http://schemas.openxmlformats.org/markup-compatibility/2006">
-        <mc:Choice xmlns:a14="http://schemas.microsoft.com/office/drawing/2010/main" Requires="a14">
+      <mc:AlternateContent xmlns:mc="http://schemas.openxmlformats.org/markup-compatibility/2006" xmlns:a14="http://schemas.microsoft.com/office/drawing/2010/main">
+        <mc:Choice Requires="a14">
           <p:sp>
             <p:nvSpPr>
               <p:cNvPr id="54" name="TextBox 53">
@@ -3989,6 +3996,7 @@
               </a:bodyPr>
               <a:lstStyle/>
               <a:p>
+                <a:pPr/>
                 <a14:m>
                   <m:oMathPara xmlns:m="http://schemas.openxmlformats.org/officeDocument/2006/math">
                     <m:oMathParaPr>
@@ -4028,7 +4036,7 @@
             </p:txBody>
           </p:sp>
         </mc:Choice>
-        <mc:Fallback>
+        <mc:Fallback xmlns="">
           <p:sp>
             <p:nvSpPr>
               <p:cNvPr id="54" name="TextBox 53">
@@ -4073,8 +4081,8 @@
           </p:sp>
         </mc:Fallback>
       </mc:AlternateContent>
-      <mc:AlternateContent xmlns:mc="http://schemas.openxmlformats.org/markup-compatibility/2006">
-        <mc:Choice xmlns:a14="http://schemas.microsoft.com/office/drawing/2010/main" Requires="a14">
+      <mc:AlternateContent xmlns:mc="http://schemas.openxmlformats.org/markup-compatibility/2006" xmlns:a14="http://schemas.microsoft.com/office/drawing/2010/main">
+        <mc:Choice Requires="a14">
           <p:sp>
             <p:nvSpPr>
               <p:cNvPr id="55" name="TextBox 54">
@@ -4103,6 +4111,7 @@
               </a:bodyPr>
               <a:lstStyle/>
               <a:p>
+                <a:pPr/>
                 <a14:m>
                   <m:oMathPara xmlns:m="http://schemas.openxmlformats.org/officeDocument/2006/math">
                     <m:oMathParaPr>
@@ -4122,13 +4131,7 @@
                             <a:rPr lang="en-US" sz="1400" b="0" i="1" smtClean="0">
                               <a:latin typeface="Cambria Math" panose="02040503050406030204" pitchFamily="18" charset="0"/>
                             </a:rPr>
-                            <m:t>2</m:t>
-                          </m:r>
-                          <m:r>
-                            <a:rPr lang="en-US" sz="1400" b="0" i="1" smtClean="0">
-                              <a:latin typeface="Cambria Math" panose="02040503050406030204" pitchFamily="18" charset="0"/>
-                            </a:rPr>
-                            <m:t>0</m:t>
+                            <m:t>20</m:t>
                           </m:r>
                         </m:e>
                         <m:sup>
@@ -4148,7 +4151,7 @@
             </p:txBody>
           </p:sp>
         </mc:Choice>
-        <mc:Fallback>
+        <mc:Fallback xmlns="">
           <p:sp>
             <p:nvSpPr>
               <p:cNvPr id="55" name="TextBox 54">
@@ -4369,8 +4372,8 @@
           </a:prstGeom>
         </p:spPr>
       </p:pic>
-      <mc:AlternateContent xmlns:mc="http://schemas.openxmlformats.org/markup-compatibility/2006">
-        <mc:Choice xmlns:a14="http://schemas.microsoft.com/office/drawing/2010/main" Requires="a14">
+      <mc:AlternateContent xmlns:mc="http://schemas.openxmlformats.org/markup-compatibility/2006" xmlns:a14="http://schemas.microsoft.com/office/drawing/2010/main">
+        <mc:Choice Requires="a14">
           <p:sp>
             <p:nvSpPr>
               <p:cNvPr id="61" name="TextBox 60">
@@ -4399,6 +4402,7 @@
               </a:bodyPr>
               <a:lstStyle/>
               <a:p>
+                <a:pPr/>
                 <a14:m>
                   <m:oMathPara xmlns:m="http://schemas.openxmlformats.org/officeDocument/2006/math">
                     <m:oMathParaPr>
@@ -4419,7 +4423,7 @@
             </p:txBody>
           </p:sp>
         </mc:Choice>
-        <mc:Fallback>
+        <mc:Fallback xmlns="">
           <p:sp>
             <p:nvSpPr>
               <p:cNvPr id="61" name="TextBox 60">
@@ -4464,8 +4468,8 @@
           </p:sp>
         </mc:Fallback>
       </mc:AlternateContent>
-      <mc:AlternateContent xmlns:mc="http://schemas.openxmlformats.org/markup-compatibility/2006">
-        <mc:Choice xmlns:a14="http://schemas.microsoft.com/office/drawing/2010/main" Requires="a14">
+      <mc:AlternateContent xmlns:mc="http://schemas.openxmlformats.org/markup-compatibility/2006" xmlns:a14="http://schemas.microsoft.com/office/drawing/2010/main">
+        <mc:Choice Requires="a14">
           <p:sp>
             <p:nvSpPr>
               <p:cNvPr id="63" name="TextBox 62">
@@ -4494,6 +4498,7 @@
               </a:bodyPr>
               <a:lstStyle/>
               <a:p>
+                <a:pPr/>
                 <a14:m>
                   <m:oMathPara xmlns:m="http://schemas.openxmlformats.org/officeDocument/2006/math">
                     <m:oMathParaPr>
@@ -4514,7 +4519,7 @@
             </p:txBody>
           </p:sp>
         </mc:Choice>
-        <mc:Fallback>
+        <mc:Fallback xmlns="">
           <p:sp>
             <p:nvSpPr>
               <p:cNvPr id="63" name="TextBox 62">
@@ -4559,8 +4564,8 @@
           </p:sp>
         </mc:Fallback>
       </mc:AlternateContent>
-      <mc:AlternateContent xmlns:mc="http://schemas.openxmlformats.org/markup-compatibility/2006">
-        <mc:Choice xmlns:a14="http://schemas.microsoft.com/office/drawing/2010/main" Requires="a14">
+      <mc:AlternateContent xmlns:mc="http://schemas.openxmlformats.org/markup-compatibility/2006" xmlns:a14="http://schemas.microsoft.com/office/drawing/2010/main">
+        <mc:Choice Requires="a14">
           <p:sp>
             <p:nvSpPr>
               <p:cNvPr id="64" name="TextBox 63">
@@ -4589,6 +4594,7 @@
               </a:bodyPr>
               <a:lstStyle/>
               <a:p>
+                <a:pPr/>
                 <a14:m>
                   <m:oMathPara xmlns:m="http://schemas.openxmlformats.org/officeDocument/2006/math">
                     <m:oMathParaPr>
@@ -4609,7 +4615,7 @@
             </p:txBody>
           </p:sp>
         </mc:Choice>
-        <mc:Fallback>
+        <mc:Fallback xmlns="">
           <p:sp>
             <p:nvSpPr>
               <p:cNvPr id="64" name="TextBox 63">
@@ -4654,8 +4660,8 @@
           </p:sp>
         </mc:Fallback>
       </mc:AlternateContent>
-      <mc:AlternateContent xmlns:mc="http://schemas.openxmlformats.org/markup-compatibility/2006">
-        <mc:Choice xmlns:a14="http://schemas.microsoft.com/office/drawing/2010/main" Requires="a14">
+      <mc:AlternateContent xmlns:mc="http://schemas.openxmlformats.org/markup-compatibility/2006" xmlns:a14="http://schemas.microsoft.com/office/drawing/2010/main">
+        <mc:Choice Requires="a14">
           <p:sp>
             <p:nvSpPr>
               <p:cNvPr id="65" name="TextBox 64">
@@ -4684,6 +4690,7 @@
               </a:bodyPr>
               <a:lstStyle/>
               <a:p>
+                <a:pPr/>
                 <a14:m>
                   <m:oMathPara xmlns:m="http://schemas.openxmlformats.org/officeDocument/2006/math">
                     <m:oMathParaPr>
@@ -4704,7 +4711,7 @@
             </p:txBody>
           </p:sp>
         </mc:Choice>
-        <mc:Fallback>
+        <mc:Fallback xmlns="">
           <p:sp>
             <p:nvSpPr>
               <p:cNvPr id="65" name="TextBox 64">
@@ -4749,8 +4756,8 @@
           </p:sp>
         </mc:Fallback>
       </mc:AlternateContent>
-      <mc:AlternateContent xmlns:mc="http://schemas.openxmlformats.org/markup-compatibility/2006">
-        <mc:Choice xmlns:a14="http://schemas.microsoft.com/office/drawing/2010/main" Requires="a14">
+      <mc:AlternateContent xmlns:mc="http://schemas.openxmlformats.org/markup-compatibility/2006" xmlns:a14="http://schemas.microsoft.com/office/drawing/2010/main">
+        <mc:Choice Requires="a14">
           <p:sp>
             <p:nvSpPr>
               <p:cNvPr id="66" name="TextBox 65">
@@ -4779,6 +4786,7 @@
               </a:bodyPr>
               <a:lstStyle/>
               <a:p>
+                <a:pPr/>
                 <a14:m>
                   <m:oMathPara xmlns:m="http://schemas.openxmlformats.org/officeDocument/2006/math">
                     <m:oMathParaPr>
@@ -4799,7 +4807,7 @@
             </p:txBody>
           </p:sp>
         </mc:Choice>
-        <mc:Fallback>
+        <mc:Fallback xmlns="">
           <p:sp>
             <p:nvSpPr>
               <p:cNvPr id="66" name="TextBox 65">
@@ -4844,8 +4852,8 @@
           </p:sp>
         </mc:Fallback>
       </mc:AlternateContent>
-      <mc:AlternateContent xmlns:mc="http://schemas.openxmlformats.org/markup-compatibility/2006">
-        <mc:Choice xmlns:a14="http://schemas.microsoft.com/office/drawing/2010/main" Requires="a14">
+      <mc:AlternateContent xmlns:mc="http://schemas.openxmlformats.org/markup-compatibility/2006" xmlns:a14="http://schemas.microsoft.com/office/drawing/2010/main">
+        <mc:Choice Requires="a14">
           <p:sp>
             <p:nvSpPr>
               <p:cNvPr id="67" name="TextBox 66">
@@ -4874,6 +4882,7 @@
               </a:bodyPr>
               <a:lstStyle/>
               <a:p>
+                <a:pPr/>
                 <a14:m>
                   <m:oMathPara xmlns:m="http://schemas.openxmlformats.org/officeDocument/2006/math">
                     <m:oMathParaPr>
@@ -4894,7 +4903,7 @@
             </p:txBody>
           </p:sp>
         </mc:Choice>
-        <mc:Fallback>
+        <mc:Fallback xmlns="">
           <p:sp>
             <p:nvSpPr>
               <p:cNvPr id="67" name="TextBox 66">
@@ -4939,8 +4948,8 @@
           </p:sp>
         </mc:Fallback>
       </mc:AlternateContent>
-      <mc:AlternateContent xmlns:mc="http://schemas.openxmlformats.org/markup-compatibility/2006">
-        <mc:Choice xmlns:a14="http://schemas.microsoft.com/office/drawing/2010/main" Requires="a14">
+      <mc:AlternateContent xmlns:mc="http://schemas.openxmlformats.org/markup-compatibility/2006" xmlns:a14="http://schemas.microsoft.com/office/drawing/2010/main">
+        <mc:Choice Requires="a14">
           <p:sp>
             <p:nvSpPr>
               <p:cNvPr id="69" name="Rectangle 68">
@@ -4985,13 +4994,7 @@
                         <a:rPr lang="en-US" sz="1400" b="0" i="1" smtClean="0">
                           <a:latin typeface="Cambria Math" panose="02040503050406030204" pitchFamily="18" charset="0"/>
                         </a:rPr>
-                        <m:t>0</m:t>
-                      </m:r>
-                      <m:r>
-                        <a:rPr lang="en-US" sz="1400" b="0" i="1" smtClean="0">
-                          <a:latin typeface="Cambria Math" panose="02040503050406030204" pitchFamily="18" charset="0"/>
-                        </a:rPr>
-                        <m:t>%</m:t>
+                        <m:t>0%</m:t>
                       </m:r>
                     </m:oMath>
                   </m:oMathPara>
@@ -5001,7 +5004,7 @@
             </p:txBody>
           </p:sp>
         </mc:Choice>
-        <mc:Fallback>
+        <mc:Fallback xmlns="">
           <p:sp>
             <p:nvSpPr>
               <p:cNvPr id="69" name="Rectangle 68">
@@ -5046,8 +5049,8 @@
           </p:sp>
         </mc:Fallback>
       </mc:AlternateContent>
-      <mc:AlternateContent xmlns:mc="http://schemas.openxmlformats.org/markup-compatibility/2006">
-        <mc:Choice xmlns:a14="http://schemas.microsoft.com/office/drawing/2010/main" Requires="a14">
+      <mc:AlternateContent xmlns:mc="http://schemas.openxmlformats.org/markup-compatibility/2006" xmlns:a14="http://schemas.microsoft.com/office/drawing/2010/main">
+        <mc:Choice Requires="a14">
           <p:sp>
             <p:nvSpPr>
               <p:cNvPr id="70" name="Rectangle 69">
@@ -5102,7 +5105,7 @@
             </p:txBody>
           </p:sp>
         </mc:Choice>
-        <mc:Fallback>
+        <mc:Fallback xmlns="">
           <p:sp>
             <p:nvSpPr>
               <p:cNvPr id="70" name="Rectangle 69">
@@ -5147,8 +5150,8 @@
           </p:sp>
         </mc:Fallback>
       </mc:AlternateContent>
-      <mc:AlternateContent xmlns:mc="http://schemas.openxmlformats.org/markup-compatibility/2006">
-        <mc:Choice xmlns:a14="http://schemas.microsoft.com/office/drawing/2010/main" Requires="a14">
+      <mc:AlternateContent xmlns:mc="http://schemas.openxmlformats.org/markup-compatibility/2006" xmlns:a14="http://schemas.microsoft.com/office/drawing/2010/main">
+        <mc:Choice Requires="a14">
           <p:sp>
             <p:nvSpPr>
               <p:cNvPr id="71" name="Rectangle 70">
@@ -5193,13 +5196,7 @@
                         <a:rPr lang="en-US" sz="1400" b="0" i="1" smtClean="0">
                           <a:latin typeface="Cambria Math" panose="02040503050406030204" pitchFamily="18" charset="0"/>
                         </a:rPr>
-                        <m:t>0</m:t>
-                      </m:r>
-                      <m:r>
-                        <a:rPr lang="en-US" sz="1400" b="0" i="1" smtClean="0">
-                          <a:latin typeface="Cambria Math" panose="02040503050406030204" pitchFamily="18" charset="0"/>
-                        </a:rPr>
-                        <m:t>%</m:t>
+                        <m:t>0%</m:t>
                       </m:r>
                     </m:oMath>
                   </m:oMathPara>
@@ -5209,7 +5206,7 @@
             </p:txBody>
           </p:sp>
         </mc:Choice>
-        <mc:Fallback>
+        <mc:Fallback xmlns="">
           <p:sp>
             <p:nvSpPr>
               <p:cNvPr id="71" name="Rectangle 70">
@@ -5254,8 +5251,8 @@
           </p:sp>
         </mc:Fallback>
       </mc:AlternateContent>
-      <mc:AlternateContent xmlns:mc="http://schemas.openxmlformats.org/markup-compatibility/2006">
-        <mc:Choice xmlns:a14="http://schemas.microsoft.com/office/drawing/2010/main" Requires="a14">
+      <mc:AlternateContent xmlns:mc="http://schemas.openxmlformats.org/markup-compatibility/2006" xmlns:a14="http://schemas.microsoft.com/office/drawing/2010/main">
+        <mc:Choice Requires="a14">
           <p:sp>
             <p:nvSpPr>
               <p:cNvPr id="72" name="Rectangle 71">
@@ -5310,7 +5307,7 @@
             </p:txBody>
           </p:sp>
         </mc:Choice>
-        <mc:Fallback>
+        <mc:Fallback xmlns="">
           <p:sp>
             <p:nvSpPr>
               <p:cNvPr id="72" name="Rectangle 71">
@@ -5355,8 +5352,8 @@
           </p:sp>
         </mc:Fallback>
       </mc:AlternateContent>
-      <mc:AlternateContent xmlns:mc="http://schemas.openxmlformats.org/markup-compatibility/2006">
-        <mc:Choice xmlns:a14="http://schemas.microsoft.com/office/drawing/2010/main" Requires="a14">
+      <mc:AlternateContent xmlns:mc="http://schemas.openxmlformats.org/markup-compatibility/2006" xmlns:a14="http://schemas.microsoft.com/office/drawing/2010/main">
+        <mc:Choice Requires="a14">
           <p:sp>
             <p:nvSpPr>
               <p:cNvPr id="73" name="Rectangle 72">
@@ -5405,7 +5402,7 @@
             </p:txBody>
           </p:sp>
         </mc:Choice>
-        <mc:Fallback>
+        <mc:Fallback xmlns="">
           <p:sp>
             <p:nvSpPr>
               <p:cNvPr id="73" name="Rectangle 72">
@@ -5450,8 +5447,8 @@
           </p:sp>
         </mc:Fallback>
       </mc:AlternateContent>
-      <mc:AlternateContent xmlns:mc="http://schemas.openxmlformats.org/markup-compatibility/2006">
-        <mc:Choice xmlns:a14="http://schemas.microsoft.com/office/drawing/2010/main" Requires="a14">
+      <mc:AlternateContent xmlns:mc="http://schemas.openxmlformats.org/markup-compatibility/2006" xmlns:a14="http://schemas.microsoft.com/office/drawing/2010/main">
+        <mc:Choice Requires="a14">
           <p:sp>
             <p:nvSpPr>
               <p:cNvPr id="75" name="TextBox 74">
@@ -5480,6 +5477,7 @@
               </a:bodyPr>
               <a:lstStyle/>
               <a:p>
+                <a:pPr/>
                 <a14:m>
                   <m:oMathPara xmlns:m="http://schemas.openxmlformats.org/officeDocument/2006/math">
                     <m:oMathParaPr>
@@ -5519,7 +5517,7 @@
             </p:txBody>
           </p:sp>
         </mc:Choice>
-        <mc:Fallback>
+        <mc:Fallback xmlns="">
           <p:sp>
             <p:nvSpPr>
               <p:cNvPr id="75" name="TextBox 74">
@@ -5564,8 +5562,8 @@
           </p:sp>
         </mc:Fallback>
       </mc:AlternateContent>
-      <mc:AlternateContent xmlns:mc="http://schemas.openxmlformats.org/markup-compatibility/2006">
-        <mc:Choice xmlns:a14="http://schemas.microsoft.com/office/drawing/2010/main" Requires="a14">
+      <mc:AlternateContent xmlns:mc="http://schemas.openxmlformats.org/markup-compatibility/2006" xmlns:a14="http://schemas.microsoft.com/office/drawing/2010/main">
+        <mc:Choice Requires="a14">
           <p:sp>
             <p:nvSpPr>
               <p:cNvPr id="76" name="TextBox 75">
@@ -5594,6 +5592,7 @@
               </a:bodyPr>
               <a:lstStyle/>
               <a:p>
+                <a:pPr/>
                 <a14:m>
                   <m:oMathPara xmlns:m="http://schemas.openxmlformats.org/officeDocument/2006/math">
                     <m:oMathParaPr>
@@ -5633,7 +5632,7 @@
             </p:txBody>
           </p:sp>
         </mc:Choice>
-        <mc:Fallback>
+        <mc:Fallback xmlns="">
           <p:sp>
             <p:nvSpPr>
               <p:cNvPr id="76" name="TextBox 75">
@@ -5678,8 +5677,8 @@
           </p:sp>
         </mc:Fallback>
       </mc:AlternateContent>
-      <mc:AlternateContent xmlns:mc="http://schemas.openxmlformats.org/markup-compatibility/2006">
-        <mc:Choice xmlns:a14="http://schemas.microsoft.com/office/drawing/2010/main" Requires="a14">
+      <mc:AlternateContent xmlns:mc="http://schemas.openxmlformats.org/markup-compatibility/2006" xmlns:a14="http://schemas.microsoft.com/office/drawing/2010/main">
+        <mc:Choice Requires="a14">
           <p:sp>
             <p:nvSpPr>
               <p:cNvPr id="77" name="TextBox 76">
@@ -5708,6 +5707,7 @@
               </a:bodyPr>
               <a:lstStyle/>
               <a:p>
+                <a:pPr/>
                 <a14:m>
                   <m:oMathPara xmlns:m="http://schemas.openxmlformats.org/officeDocument/2006/math">
                     <m:oMathParaPr>
@@ -5747,7 +5747,7 @@
             </p:txBody>
           </p:sp>
         </mc:Choice>
-        <mc:Fallback>
+        <mc:Fallback xmlns="">
           <p:sp>
             <p:nvSpPr>
               <p:cNvPr id="77" name="TextBox 76">
@@ -5792,8 +5792,8 @@
           </p:sp>
         </mc:Fallback>
       </mc:AlternateContent>
-      <mc:AlternateContent xmlns:mc="http://schemas.openxmlformats.org/markup-compatibility/2006">
-        <mc:Choice xmlns:a14="http://schemas.microsoft.com/office/drawing/2010/main" Requires="a14">
+      <mc:AlternateContent xmlns:mc="http://schemas.openxmlformats.org/markup-compatibility/2006" xmlns:a14="http://schemas.microsoft.com/office/drawing/2010/main">
+        <mc:Choice Requires="a14">
           <p:sp>
             <p:nvSpPr>
               <p:cNvPr id="78" name="TextBox 77">
@@ -5822,6 +5822,7 @@
               </a:bodyPr>
               <a:lstStyle/>
               <a:p>
+                <a:pPr/>
                 <a14:m>
                   <m:oMathPara xmlns:m="http://schemas.openxmlformats.org/officeDocument/2006/math">
                     <m:oMathParaPr>
@@ -5861,7 +5862,7 @@
             </p:txBody>
           </p:sp>
         </mc:Choice>
-        <mc:Fallback>
+        <mc:Fallback xmlns="">
           <p:sp>
             <p:nvSpPr>
               <p:cNvPr id="78" name="TextBox 77">
@@ -5910,6 +5911,103 @@
     <p:extLst>
       <p:ext uri="{BB962C8B-B14F-4D97-AF65-F5344CB8AC3E}">
         <p14:creationId xmlns:p14="http://schemas.microsoft.com/office/powerpoint/2010/main" val="4201645930"/>
+      </p:ext>
+    </p:extLst>
+  </p:cSld>
+  <p:clrMapOvr>
+    <a:masterClrMapping/>
+  </p:clrMapOvr>
+</p:sld>
+</file>
+
+<file path=ppt/slides/slide2.xml><?xml version="1.0" encoding="utf-8"?>
+<p:sld xmlns:a="http://schemas.openxmlformats.org/drawingml/2006/main" xmlns:r="http://schemas.openxmlformats.org/officeDocument/2006/relationships" xmlns:p="http://schemas.openxmlformats.org/presentationml/2006/main">
+  <p:cSld>
+    <p:spTree>
+      <p:nvGrpSpPr>
+        <p:cNvPr id="1" name=""/>
+        <p:cNvGrpSpPr/>
+        <p:nvPr/>
+      </p:nvGrpSpPr>
+      <p:grpSpPr>
+        <a:xfrm>
+          <a:off x="0" y="0"/>
+          <a:ext cx="0" cy="0"/>
+          <a:chOff x="0" y="0"/>
+          <a:chExt cx="0" cy="0"/>
+        </a:xfrm>
+      </p:grpSpPr>
+      <p:pic>
+        <p:nvPicPr>
+          <p:cNvPr id="2" name="Picture 1">
+            <a:extLst>
+              <a:ext uri="{FF2B5EF4-FFF2-40B4-BE49-F238E27FC236}">
+                <a16:creationId xmlns:a16="http://schemas.microsoft.com/office/drawing/2014/main" id="{366866AF-BE60-427E-A384-0BB65AEF21A2}"/>
+              </a:ext>
+            </a:extLst>
+          </p:cNvPr>
+          <p:cNvPicPr>
+            <a:picLocks noChangeAspect="1"/>
+          </p:cNvPicPr>
+          <p:nvPr/>
+        </p:nvPicPr>
+        <p:blipFill rotWithShape="1">
+          <a:blip r:embed="rId2"/>
+          <a:srcRect b="8641"/>
+          <a:stretch/>
+        </p:blipFill>
+        <p:spPr>
+          <a:xfrm>
+            <a:off x="3164335" y="709844"/>
+            <a:ext cx="4762500" cy="1740393"/>
+          </a:xfrm>
+          <a:prstGeom prst="rect">
+            <a:avLst/>
+          </a:prstGeom>
+        </p:spPr>
+      </p:pic>
+      <p:sp>
+        <p:nvSpPr>
+          <p:cNvPr id="3" name="TextBox 2">
+            <a:extLst>
+              <a:ext uri="{FF2B5EF4-FFF2-40B4-BE49-F238E27FC236}">
+                <a16:creationId xmlns:a16="http://schemas.microsoft.com/office/drawing/2014/main" id="{E960F574-566D-4654-845B-876B7E2C0964}"/>
+              </a:ext>
+            </a:extLst>
+          </p:cNvPr>
+          <p:cNvSpPr txBox="1"/>
+          <p:nvPr/>
+        </p:nvSpPr>
+        <p:spPr>
+          <a:xfrm>
+            <a:off x="5415377" y="2343705"/>
+            <a:ext cx="452761" cy="338554"/>
+          </a:xfrm>
+          <a:prstGeom prst="rect">
+            <a:avLst/>
+          </a:prstGeom>
+          <a:noFill/>
+        </p:spPr>
+        <p:txBody>
+          <a:bodyPr wrap="square" rtlCol="0">
+            <a:spAutoFit/>
+          </a:bodyPr>
+          <a:lstStyle/>
+          <a:p>
+            <a:r>
+              <a:rPr lang="en-US" sz="1600" dirty="0">
+                <a:latin typeface="Times New Roman" panose="02020603050405020304" pitchFamily="18" charset="0"/>
+                <a:cs typeface="Times New Roman" panose="02020603050405020304" pitchFamily="18" charset="0"/>
+              </a:rPr>
+              <a:t>(a)</a:t>
+            </a:r>
+          </a:p>
+        </p:txBody>
+      </p:sp>
+    </p:spTree>
+    <p:extLst>
+      <p:ext uri="{BB962C8B-B14F-4D97-AF65-F5344CB8AC3E}">
+        <p14:creationId xmlns:p14="http://schemas.microsoft.com/office/powerpoint/2010/main" val="705458444"/>
       </p:ext>
     </p:extLst>
   </p:cSld>

</xml_diff>